<commit_message>
update ppt and diagram
</commit_message>
<xml_diff>
--- a/5100final.pptx
+++ b/5100final.pptx
@@ -7,14 +7,15 @@
     <p:sldMasterId id="2147483668" r:id="rId4"/>
   </p:sldMasterIdLst>
   <p:notesMasterIdLst>
-    <p:notesMasterId r:id="rId10"/>
+    <p:notesMasterId r:id="rId11"/>
   </p:notesMasterIdLst>
   <p:sldIdLst>
     <p:sldId id="256" r:id="rId5"/>
     <p:sldId id="293" r:id="rId6"/>
     <p:sldId id="276" r:id="rId7"/>
     <p:sldId id="314" r:id="rId8"/>
-    <p:sldId id="262" r:id="rId9"/>
+    <p:sldId id="316" r:id="rId9"/>
+    <p:sldId id="262" r:id="rId10"/>
   </p:sldIdLst>
   <p:sldSz cx="9144000" cy="5143500" type="screen16x9"/>
   <p:notesSz cx="6858000" cy="9144000"/>
@@ -21145,10 +21146,7 @@
             <a:avLst/>
           </a:prstGeom>
           <a:solidFill>
-            <a:schemeClr val="tx1">
-              <a:lumMod val="65000"/>
-              <a:lumOff val="35000"/>
-            </a:schemeClr>
+            <a:srgbClr val="FFCE29"/>
           </a:solidFill>
           <a:ln w="88900">
             <a:solidFill>
@@ -21205,10 +21203,7 @@
             <a:avLst/>
           </a:prstGeom>
           <a:solidFill>
-            <a:schemeClr val="tx1">
-              <a:lumMod val="50000"/>
-              <a:lumOff val="50000"/>
-            </a:schemeClr>
+            <a:srgbClr val="FFCE29"/>
           </a:solidFill>
           <a:ln w="88900">
             <a:solidFill>
@@ -22495,7 +22490,10 @@
             </a:pathLst>
           </a:custGeom>
           <a:solidFill>
-            <a:schemeClr val="accent1"/>
+            <a:schemeClr val="tx1">
+              <a:lumMod val="65000"/>
+              <a:lumOff val="35000"/>
+            </a:schemeClr>
           </a:solidFill>
           <a:ln>
             <a:noFill/>
@@ -24645,7 +24643,10 @@
             </a:pathLst>
           </a:custGeom>
           <a:solidFill>
-            <a:schemeClr val="accent4"/>
+            <a:schemeClr val="tx1">
+              <a:lumMod val="65000"/>
+              <a:lumOff val="35000"/>
+            </a:schemeClr>
           </a:solidFill>
           <a:ln>
             <a:noFill/>
@@ -25299,6 +25300,48 @@
         <p:cNvGrpSpPr/>
         <p:nvPr/>
       </p:nvGrpSpPr>
+      <p:grpSpPr/>
+      <p:pic>
+        <p:nvPicPr>
+          <p:cNvPr id="2" name="Picture 1" descr="final"/>
+          <p:cNvPicPr>
+            <a:picLocks noChangeAspect="1"/>
+          </p:cNvPicPr>
+          <p:nvPr/>
+        </p:nvPicPr>
+        <p:blipFill>
+          <a:blip r:embed="rId1"/>
+          <a:stretch>
+            <a:fillRect/>
+          </a:stretch>
+        </p:blipFill>
+        <p:spPr>
+          <a:xfrm>
+            <a:off x="763905" y="30480"/>
+            <a:ext cx="7297420" cy="5083175"/>
+          </a:xfrm>
+          <a:prstGeom prst="rect">
+            <a:avLst/>
+          </a:prstGeom>
+        </p:spPr>
+      </p:pic>
+    </p:spTree>
+  </p:cSld>
+  <p:clrMapOvr>
+    <a:masterClrMapping/>
+  </p:clrMapOvr>
+</p:sld>
+</file>
+
+<file path=ppt/slides/slide6.xml><?xml version="1.0" encoding="utf-8"?>
+<p:sld xmlns:a="http://schemas.openxmlformats.org/drawingml/2006/main" xmlns:r="http://schemas.openxmlformats.org/officeDocument/2006/relationships" xmlns:p="http://schemas.openxmlformats.org/presentationml/2006/main">
+  <p:cSld>
+    <p:spTree>
+      <p:nvGrpSpPr>
+        <p:cNvPr id="1" name=""/>
+        <p:cNvGrpSpPr/>
+        <p:nvPr/>
+      </p:nvGrpSpPr>
       <p:grpSpPr>
         <a:xfrm>
           <a:off x="0" y="0"/>
@@ -25324,31 +25367,14 @@
           <a:p>
             <a:r>
               <a:rPr lang="en-US" altLang="ko-KR" dirty="0"/>
-              <a:t>Thank you</a:t>
+              <a:t>Next</a:t>
             </a:r>
-            <a:endParaRPr lang="ko-KR" altLang="en-US" dirty="0"/>
+            <a:endParaRPr lang="en-US" altLang="ko-KR" dirty="0"/>
           </a:p>
-        </p:txBody>
-      </p:sp>
-      <p:sp>
-        <p:nvSpPr>
-          <p:cNvPr id="3" name="Text Placeholder 2"/>
-          <p:cNvSpPr>
-            <a:spLocks noGrp="1"/>
-          </p:cNvSpPr>
-          <p:nvPr>
-            <p:ph type="body" sz="quarter" idx="11"/>
-          </p:nvPr>
-        </p:nvSpPr>
-        <p:spPr/>
-        <p:txBody>
-          <a:bodyPr/>
-          <a:lstStyle/>
           <a:p>
-            <a:pPr lvl="0"/>
             <a:r>
               <a:rPr lang="en-US" altLang="ko-KR" dirty="0"/>
-              <a:t>Insert the title of your subtitle Here</a:t>
+              <a:t>Application Demo</a:t>
             </a:r>
             <a:endParaRPr lang="en-US" altLang="ko-KR" dirty="0"/>
           </a:p>

</xml_diff>